<commit_message>
L2S20-87 #time 1h #comment powerpoint presentation complete update
</commit_message>
<xml_diff>
--- a/documentation/SprintD/US9002_Presentation.pptx
+++ b/documentation/SprintD/US9002_Presentation.pptx
@@ -18,12 +18,13 @@
     <p:sldId id="280" r:id="rId12"/>
     <p:sldId id="281" r:id="rId13"/>
     <p:sldId id="282" r:id="rId14"/>
-    <p:sldId id="275" r:id="rId15"/>
+    <p:sldId id="283" r:id="rId15"/>
+    <p:sldId id="275" r:id="rId16"/>
   </p:sldIdLst>
   <p:sldSz cx="12192000" cy="6858000"/>
   <p:notesSz cx="6858000" cy="9144000"/>
   <p:custDataLst>
-    <p:tags r:id="rId16"/>
+    <p:tags r:id="rId17"/>
   </p:custDataLst>
   <p:defaultTextStyle>
     <a:defPPr>
@@ -14567,8 +14568,8 @@
         </p:nvSpPr>
         <p:spPr>
           <a:xfrm>
-            <a:off x="1154953" y="3546036"/>
-            <a:ext cx="5211979" cy="3416300"/>
+            <a:off x="1154953" y="3278749"/>
+            <a:ext cx="6397313" cy="3416300"/>
           </a:xfrm>
         </p:spPr>
         <p:txBody>
@@ -14622,10 +14623,10 @@
       </p:sp>
       <p:pic>
         <p:nvPicPr>
-          <p:cNvPr id="5" name="Imagem 4">
+          <p:cNvPr id="7" name="Graphic 6" descr="Utilizador">
             <a:extLst>
               <a:ext uri="{FF2B5EF4-FFF2-40B4-BE49-F238E27FC236}">
-                <a16:creationId xmlns:a16="http://schemas.microsoft.com/office/drawing/2014/main" id="{8782ECFF-7D01-1387-92C2-25F94E83717E}"/>
+                <a16:creationId xmlns:a16="http://schemas.microsoft.com/office/drawing/2014/main" id="{4460AEE2-8D43-AA39-C22B-19774ABB004B}"/>
               </a:ext>
             </a:extLst>
           </p:cNvPr>
@@ -14635,15 +14636,24 @@
           <p:nvPr/>
         </p:nvPicPr>
         <p:blipFill>
-          <a:blip r:embed="rId2"/>
+          <a:blip r:embed="rId2">
+            <a:extLst>
+              <a:ext uri="{28A0092B-C50C-407E-A947-70E740481C1C}">
+                <a14:useLocalDpi xmlns:a14="http://schemas.microsoft.com/office/drawing/2010/main" val="0"/>
+              </a:ext>
+              <a:ext uri="{96DAC541-7B7A-43D3-8B79-37D633B846F1}">
+                <asvg:svgBlip xmlns:asvg="http://schemas.microsoft.com/office/drawing/2016/SVG/main" r:embed="rId3"/>
+              </a:ext>
+            </a:extLst>
+          </a:blip>
           <a:stretch>
             <a:fillRect/>
           </a:stretch>
         </p:blipFill>
         <p:spPr>
           <a:xfrm>
-            <a:off x="7076299" y="2058408"/>
-            <a:ext cx="4605161" cy="4605161"/>
+            <a:off x="8027013" y="2775951"/>
+            <a:ext cx="3067163" cy="3067163"/>
           </a:xfrm>
           <a:prstGeom prst="roundRect">
             <a:avLst>
@@ -14673,6 +14683,1057 @@
 </file>
 
 <file path=ppt/slides/slide14.xml><?xml version="1.0" encoding="utf-8"?>
+<p:sld xmlns:a="http://schemas.openxmlformats.org/drawingml/2006/main" xmlns:r="http://schemas.openxmlformats.org/officeDocument/2006/relationships" xmlns:p="http://schemas.openxmlformats.org/presentationml/2006/main">
+  <p:cSld>
+    <p:bg>
+      <p:bgPr>
+        <a:solidFill>
+          <a:schemeClr val="bg1"/>
+        </a:solidFill>
+        <a:effectLst/>
+      </p:bgPr>
+    </p:bg>
+    <p:spTree>
+      <p:nvGrpSpPr>
+        <p:cNvPr id="1" name=""/>
+        <p:cNvGrpSpPr/>
+        <p:nvPr/>
+      </p:nvGrpSpPr>
+      <p:grpSpPr>
+        <a:xfrm>
+          <a:off x="0" y="0"/>
+          <a:ext cx="0" cy="0"/>
+          <a:chOff x="0" y="0"/>
+          <a:chExt cx="0" cy="0"/>
+        </a:xfrm>
+      </p:grpSpPr>
+      <p:sp>
+        <p:nvSpPr>
+          <p:cNvPr id="33" name="Rectangle 32">
+            <a:extLst>
+              <a:ext uri="{FF2B5EF4-FFF2-40B4-BE49-F238E27FC236}">
+                <a16:creationId xmlns:a16="http://schemas.microsoft.com/office/drawing/2014/main" id="{EC8E7FCF-9095-4A9E-93A8-D89170DD8601}"/>
+              </a:ext>
+              <a:ext uri="{C183D7F6-B498-43B3-948B-1728B52AA6E4}">
+                <adec:decorative xmlns:adec="http://schemas.microsoft.com/office/drawing/2017/decorative" val="1"/>
+              </a:ext>
+            </a:extLst>
+          </p:cNvPr>
+          <p:cNvSpPr>
+            <a:spLocks noGrp="1" noRot="1" noChangeAspect="1" noMove="1" noResize="1" noEditPoints="1" noAdjustHandles="1" noChangeArrowheads="1" noChangeShapeType="1" noTextEdit="1"/>
+          </p:cNvSpPr>
+          <p:nvPr>
+            <p:extLst>
+              <p:ext uri="{386F3935-93C4-4BCD-93E2-E3B085C9AB24}">
+                <p16:designElem xmlns:p16="http://schemas.microsoft.com/office/powerpoint/2015/main" val="1"/>
+              </p:ext>
+            </p:extLst>
+          </p:nvPr>
+        </p:nvSpPr>
+        <p:spPr>
+          <a:xfrm>
+            <a:off x="0" y="0"/>
+            <a:ext cx="12192000" cy="6858000"/>
+          </a:xfrm>
+          <a:prstGeom prst="rect">
+            <a:avLst/>
+          </a:prstGeom>
+          <a:blipFill>
+            <a:blip r:embed="rId2">
+              <a:duotone>
+                <a:schemeClr val="dk2">
+                  <a:shade val="69000"/>
+                  <a:hueMod val="108000"/>
+                  <a:satMod val="164000"/>
+                  <a:lumMod val="74000"/>
+                </a:schemeClr>
+                <a:schemeClr val="dk2">
+                  <a:tint val="96000"/>
+                  <a:hueMod val="88000"/>
+                  <a:satMod val="140000"/>
+                  <a:lumMod val="132000"/>
+                </a:schemeClr>
+              </a:duotone>
+            </a:blip>
+            <a:stretch>
+              <a:fillRect/>
+            </a:stretch>
+          </a:blipFill>
+          <a:ln>
+            <a:noFill/>
+          </a:ln>
+        </p:spPr>
+        <p:style>
+          <a:lnRef idx="2">
+            <a:schemeClr val="accent1">
+              <a:shade val="50000"/>
+            </a:schemeClr>
+          </a:lnRef>
+          <a:fillRef idx="1">
+            <a:schemeClr val="accent1"/>
+          </a:fillRef>
+          <a:effectRef idx="0">
+            <a:schemeClr val="accent1"/>
+          </a:effectRef>
+          <a:fontRef idx="minor">
+            <a:schemeClr val="lt1"/>
+          </a:fontRef>
+        </p:style>
+      </p:sp>
+      <p:grpSp>
+        <p:nvGrpSpPr>
+          <p:cNvPr id="35" name="Group 34">
+            <a:extLst>
+              <a:ext uri="{FF2B5EF4-FFF2-40B4-BE49-F238E27FC236}">
+                <a16:creationId xmlns:a16="http://schemas.microsoft.com/office/drawing/2014/main" id="{B1E8A4BE-2A5E-45F5-998D-BE0AE6C731B1}"/>
+              </a:ext>
+              <a:ext uri="{C183D7F6-B498-43B3-948B-1728B52AA6E4}">
+                <adec:decorative xmlns:adec="http://schemas.microsoft.com/office/drawing/2017/decorative" val="1"/>
+              </a:ext>
+            </a:extLst>
+          </p:cNvPr>
+          <p:cNvGrpSpPr>
+            <a:grpSpLocks noGrp="1" noUngrp="1" noRot="1" noChangeAspect="1" noMove="1" noResize="1"/>
+          </p:cNvGrpSpPr>
+          <p:nvPr>
+            <p:extLst>
+              <p:ext uri="{386F3935-93C4-4BCD-93E2-E3B085C9AB24}">
+                <p16:designElem xmlns:p16="http://schemas.microsoft.com/office/powerpoint/2015/main" val="1"/>
+              </p:ext>
+            </p:extLst>
+          </p:nvPr>
+        </p:nvGrpSpPr>
+        <p:grpSpPr>
+          <a:xfrm>
+            <a:off x="0" y="1587"/>
+            <a:ext cx="12192000" cy="6856413"/>
+            <a:chOff x="0" y="1587"/>
+            <a:chExt cx="12192000" cy="6856413"/>
+          </a:xfrm>
+        </p:grpSpPr>
+        <p:sp>
+          <p:nvSpPr>
+            <p:cNvPr id="36" name="Oval 35">
+              <a:extLst>
+                <a:ext uri="{FF2B5EF4-FFF2-40B4-BE49-F238E27FC236}">
+                  <a16:creationId xmlns:a16="http://schemas.microsoft.com/office/drawing/2014/main" id="{4FFC6E5F-27ED-4D52-B7EF-E320B85F5F83}"/>
+                </a:ext>
+                <a:ext uri="{C183D7F6-B498-43B3-948B-1728B52AA6E4}">
+                  <adec:decorative xmlns:adec="http://schemas.microsoft.com/office/drawing/2017/decorative" val="1"/>
+                </a:ext>
+              </a:extLst>
+            </p:cNvPr>
+            <p:cNvSpPr/>
+            <p:nvPr>
+              <p:extLst>
+                <p:ext uri="{386F3935-93C4-4BCD-93E2-E3B085C9AB24}">
+                  <p16:designElem xmlns:p16="http://schemas.microsoft.com/office/powerpoint/2015/main" val="1"/>
+                </p:ext>
+              </p:extLst>
+            </p:nvPr>
+          </p:nvSpPr>
+          <p:spPr>
+            <a:xfrm>
+              <a:off x="0" y="2667000"/>
+              <a:ext cx="4191000" cy="4191000"/>
+            </a:xfrm>
+            <a:prstGeom prst="ellipse">
+              <a:avLst/>
+            </a:prstGeom>
+            <a:gradFill flip="none" rotWithShape="1">
+              <a:gsLst>
+                <a:gs pos="0">
+                  <a:schemeClr val="accent5">
+                    <a:alpha val="11000"/>
+                  </a:schemeClr>
+                </a:gs>
+                <a:gs pos="75000">
+                  <a:schemeClr val="accent5">
+                    <a:alpha val="0"/>
+                  </a:schemeClr>
+                </a:gs>
+                <a:gs pos="36000">
+                  <a:schemeClr val="accent5">
+                    <a:alpha val="10000"/>
+                  </a:schemeClr>
+                </a:gs>
+              </a:gsLst>
+              <a:path path="circle">
+                <a:fillToRect l="50000" t="50000" r="50000" b="50000"/>
+              </a:path>
+              <a:tileRect/>
+            </a:gradFill>
+            <a:ln>
+              <a:noFill/>
+            </a:ln>
+            <a:effectLst/>
+          </p:spPr>
+          <p:style>
+            <a:lnRef idx="1">
+              <a:schemeClr val="accent1"/>
+            </a:lnRef>
+            <a:fillRef idx="3">
+              <a:schemeClr val="accent1"/>
+            </a:fillRef>
+            <a:effectRef idx="2">
+              <a:schemeClr val="accent1"/>
+            </a:effectRef>
+            <a:fontRef idx="minor">
+              <a:schemeClr val="lt1"/>
+            </a:fontRef>
+          </p:style>
+        </p:sp>
+        <p:sp>
+          <p:nvSpPr>
+            <p:cNvPr id="37" name="Oval 36">
+              <a:extLst>
+                <a:ext uri="{FF2B5EF4-FFF2-40B4-BE49-F238E27FC236}">
+                  <a16:creationId xmlns:a16="http://schemas.microsoft.com/office/drawing/2014/main" id="{BE02F8FD-F963-4DBD-A3BC-CF97BDB1113B}"/>
+                </a:ext>
+                <a:ext uri="{C183D7F6-B498-43B3-948B-1728B52AA6E4}">
+                  <adec:decorative xmlns:adec="http://schemas.microsoft.com/office/drawing/2017/decorative" val="1"/>
+                </a:ext>
+              </a:extLst>
+            </p:cNvPr>
+            <p:cNvSpPr/>
+            <p:nvPr>
+              <p:extLst>
+                <p:ext uri="{386F3935-93C4-4BCD-93E2-E3B085C9AB24}">
+                  <p16:designElem xmlns:p16="http://schemas.microsoft.com/office/powerpoint/2015/main" val="1"/>
+                </p:ext>
+              </p:extLst>
+            </p:nvPr>
+          </p:nvSpPr>
+          <p:spPr>
+            <a:xfrm>
+              <a:off x="0" y="2895600"/>
+              <a:ext cx="2362200" cy="2362200"/>
+            </a:xfrm>
+            <a:prstGeom prst="ellipse">
+              <a:avLst/>
+            </a:prstGeom>
+            <a:gradFill flip="none" rotWithShape="1">
+              <a:gsLst>
+                <a:gs pos="0">
+                  <a:schemeClr val="accent5">
+                    <a:alpha val="8000"/>
+                  </a:schemeClr>
+                </a:gs>
+                <a:gs pos="72000">
+                  <a:schemeClr val="accent5">
+                    <a:alpha val="0"/>
+                  </a:schemeClr>
+                </a:gs>
+                <a:gs pos="36000">
+                  <a:schemeClr val="accent5">
+                    <a:alpha val="8000"/>
+                  </a:schemeClr>
+                </a:gs>
+              </a:gsLst>
+              <a:path path="circle">
+                <a:fillToRect l="50000" t="50000" r="50000" b="50000"/>
+              </a:path>
+              <a:tileRect/>
+            </a:gradFill>
+            <a:ln>
+              <a:noFill/>
+            </a:ln>
+            <a:effectLst/>
+          </p:spPr>
+          <p:style>
+            <a:lnRef idx="1">
+              <a:schemeClr val="accent1"/>
+            </a:lnRef>
+            <a:fillRef idx="3">
+              <a:schemeClr val="accent1"/>
+            </a:fillRef>
+            <a:effectRef idx="2">
+              <a:schemeClr val="accent1"/>
+            </a:effectRef>
+            <a:fontRef idx="minor">
+              <a:schemeClr val="lt1"/>
+            </a:fontRef>
+          </p:style>
+        </p:sp>
+        <p:sp>
+          <p:nvSpPr>
+            <p:cNvPr id="38" name="Rectangle 37">
+              <a:extLst>
+                <a:ext uri="{FF2B5EF4-FFF2-40B4-BE49-F238E27FC236}">
+                  <a16:creationId xmlns:a16="http://schemas.microsoft.com/office/drawing/2014/main" id="{57ABF6D8-2DE2-4418-ACA5-D8D27B3A0606}"/>
+                </a:ext>
+                <a:ext uri="{C183D7F6-B498-43B3-948B-1728B52AA6E4}">
+                  <adec:decorative xmlns:adec="http://schemas.microsoft.com/office/drawing/2017/decorative" val="1"/>
+                </a:ext>
+              </a:extLst>
+            </p:cNvPr>
+            <p:cNvSpPr/>
+            <p:nvPr>
+              <p:extLst>
+                <p:ext uri="{386F3935-93C4-4BCD-93E2-E3B085C9AB24}">
+                  <p16:designElem xmlns:p16="http://schemas.microsoft.com/office/powerpoint/2015/main" val="1"/>
+                </p:ext>
+              </p:extLst>
+            </p:nvPr>
+          </p:nvSpPr>
+          <p:spPr bwMode="gray">
+            <a:xfrm>
+              <a:off x="5713412" y="402165"/>
+              <a:ext cx="6055253" cy="6053670"/>
+            </a:xfrm>
+            <a:prstGeom prst="rect">
+              <a:avLst/>
+            </a:prstGeom>
+            <a:solidFill>
+              <a:schemeClr val="bg1"/>
+            </a:solidFill>
+            <a:ln>
+              <a:noFill/>
+            </a:ln>
+            <a:effectLst/>
+          </p:spPr>
+          <p:style>
+            <a:lnRef idx="1">
+              <a:schemeClr val="accent1"/>
+            </a:lnRef>
+            <a:fillRef idx="3">
+              <a:schemeClr val="accent1"/>
+            </a:fillRef>
+            <a:effectRef idx="2">
+              <a:schemeClr val="accent1"/>
+            </a:effectRef>
+            <a:fontRef idx="minor">
+              <a:schemeClr val="lt1"/>
+            </a:fontRef>
+          </p:style>
+        </p:sp>
+        <p:sp>
+          <p:nvSpPr>
+            <p:cNvPr id="39" name="Freeform 5">
+              <a:extLst>
+                <a:ext uri="{FF2B5EF4-FFF2-40B4-BE49-F238E27FC236}">
+                  <a16:creationId xmlns:a16="http://schemas.microsoft.com/office/drawing/2014/main" id="{BEFB3511-E01A-478A-9AD3-F7CD9E4DBD51}"/>
+                </a:ext>
+                <a:ext uri="{C183D7F6-B498-43B3-948B-1728B52AA6E4}">
+                  <adec:decorative xmlns:adec="http://schemas.microsoft.com/office/drawing/2017/decorative" val="1"/>
+                </a:ext>
+              </a:extLst>
+            </p:cNvPr>
+            <p:cNvSpPr/>
+            <p:nvPr>
+              <p:extLst>
+                <p:ext uri="{386F3935-93C4-4BCD-93E2-E3B085C9AB24}">
+                  <p16:designElem xmlns:p16="http://schemas.microsoft.com/office/powerpoint/2015/main" val="1"/>
+                </p:ext>
+              </p:extLst>
+            </p:nvPr>
+          </p:nvSpPr>
+          <p:spPr bwMode="gray">
+            <a:xfrm rot="15922489">
+              <a:off x="3140485" y="1826078"/>
+              <a:ext cx="3299407" cy="440924"/>
+            </a:xfrm>
+            <a:custGeom>
+              <a:avLst/>
+              <a:gdLst/>
+              <a:ahLst/>
+              <a:cxnLst/>
+              <a:rect l="l" t="t" r="r" b="b"/>
+              <a:pathLst>
+                <a:path w="10000" h="5291">
+                  <a:moveTo>
+                    <a:pt x="85" y="2532"/>
+                  </a:moveTo>
+                  <a:cubicBezTo>
+                    <a:pt x="1736" y="3911"/>
+                    <a:pt x="7524" y="5298"/>
+                    <a:pt x="9958" y="5291"/>
+                  </a:cubicBezTo>
+                  <a:cubicBezTo>
+                    <a:pt x="9989" y="1958"/>
+                    <a:pt x="9969" y="3333"/>
+                    <a:pt x="10000" y="0"/>
+                  </a:cubicBezTo>
+                  <a:lnTo>
+                    <a:pt x="10000" y="0"/>
+                  </a:lnTo>
+                  <a:lnTo>
+                    <a:pt x="9667" y="204"/>
+                  </a:lnTo>
+                  <a:lnTo>
+                    <a:pt x="9334" y="400"/>
+                  </a:lnTo>
+                  <a:lnTo>
+                    <a:pt x="9001" y="590"/>
+                  </a:lnTo>
+                  <a:lnTo>
+                    <a:pt x="8667" y="753"/>
+                  </a:lnTo>
+                  <a:lnTo>
+                    <a:pt x="8333" y="917"/>
+                  </a:lnTo>
+                  <a:lnTo>
+                    <a:pt x="7999" y="1071"/>
+                  </a:lnTo>
+                  <a:lnTo>
+                    <a:pt x="7669" y="1202"/>
+                  </a:lnTo>
+                  <a:lnTo>
+                    <a:pt x="7333" y="1325"/>
+                  </a:lnTo>
+                  <a:lnTo>
+                    <a:pt x="7000" y="1440"/>
+                  </a:lnTo>
+                  <a:lnTo>
+                    <a:pt x="6673" y="1538"/>
+                  </a:lnTo>
+                  <a:lnTo>
+                    <a:pt x="6340" y="1636"/>
+                  </a:lnTo>
+                  <a:lnTo>
+                    <a:pt x="6013" y="1719"/>
+                  </a:lnTo>
+                  <a:lnTo>
+                    <a:pt x="5686" y="1784"/>
+                  </a:lnTo>
+                  <a:lnTo>
+                    <a:pt x="5359" y="1850"/>
+                  </a:lnTo>
+                  <a:lnTo>
+                    <a:pt x="5036" y="1906"/>
+                  </a:lnTo>
+                  <a:lnTo>
+                    <a:pt x="4717" y="1948"/>
+                  </a:lnTo>
+                  <a:lnTo>
+                    <a:pt x="4396" y="1980"/>
+                  </a:lnTo>
+                  <a:lnTo>
+                    <a:pt x="4079" y="2013"/>
+                  </a:lnTo>
+                  <a:lnTo>
+                    <a:pt x="3766" y="2029"/>
+                  </a:lnTo>
+                  <a:lnTo>
+                    <a:pt x="3454" y="2046"/>
+                  </a:lnTo>
+                  <a:lnTo>
+                    <a:pt x="3145" y="2053"/>
+                  </a:lnTo>
+                  <a:lnTo>
+                    <a:pt x="2839" y="2046"/>
+                  </a:lnTo>
+                  <a:lnTo>
+                    <a:pt x="2537" y="2046"/>
+                  </a:lnTo>
+                  <a:lnTo>
+                    <a:pt x="2238" y="2029"/>
+                  </a:lnTo>
+                  <a:lnTo>
+                    <a:pt x="1943" y="2004"/>
+                  </a:lnTo>
+                  <a:lnTo>
+                    <a:pt x="1653" y="1980"/>
+                  </a:lnTo>
+                  <a:lnTo>
+                    <a:pt x="1368" y="1955"/>
+                  </a:lnTo>
+                  <a:lnTo>
+                    <a:pt x="1085" y="1915"/>
+                  </a:lnTo>
+                  <a:lnTo>
+                    <a:pt x="806" y="1873"/>
+                  </a:lnTo>
+                  <a:lnTo>
+                    <a:pt x="533" y="1833"/>
+                  </a:lnTo>
+                  <a:lnTo>
+                    <a:pt x="0" y="1726"/>
+                  </a:lnTo>
+                  <a:cubicBezTo>
+                    <a:pt x="28" y="1995"/>
+                    <a:pt x="57" y="2263"/>
+                    <a:pt x="85" y="2532"/>
+                  </a:cubicBezTo>
+                  <a:close/>
+                </a:path>
+              </a:pathLst>
+            </a:custGeom>
+            <a:solidFill>
+              <a:schemeClr val="bg1">
+                <a:alpha val="20000"/>
+              </a:schemeClr>
+            </a:solidFill>
+            <a:ln>
+              <a:noFill/>
+            </a:ln>
+          </p:spPr>
+        </p:sp>
+        <p:sp>
+          <p:nvSpPr>
+            <p:cNvPr id="40" name="Freeform 5">
+              <a:extLst>
+                <a:ext uri="{FF2B5EF4-FFF2-40B4-BE49-F238E27FC236}">
+                  <a16:creationId xmlns:a16="http://schemas.microsoft.com/office/drawing/2014/main" id="{E9FFC131-E354-415E-954E-B1FD0A5A02E1}"/>
+                </a:ext>
+                <a:ext uri="{C183D7F6-B498-43B3-948B-1728B52AA6E4}">
+                  <adec:decorative xmlns:adec="http://schemas.microsoft.com/office/drawing/2017/decorative" val="1"/>
+                </a:ext>
+              </a:extLst>
+            </p:cNvPr>
+            <p:cNvSpPr/>
+            <p:nvPr>
+              <p:extLst>
+                <p:ext uri="{386F3935-93C4-4BCD-93E2-E3B085C9AB24}">
+                  <p16:designElem xmlns:p16="http://schemas.microsoft.com/office/powerpoint/2015/main" val="1"/>
+                </p:ext>
+              </p:extLst>
+            </p:nvPr>
+          </p:nvSpPr>
+          <p:spPr bwMode="gray">
+            <a:xfrm rot="16200000">
+              <a:off x="2229377" y="2801721"/>
+              <a:ext cx="6053670" cy="1254558"/>
+            </a:xfrm>
+            <a:custGeom>
+              <a:avLst/>
+              <a:gdLst/>
+              <a:ahLst/>
+              <a:cxnLst/>
+              <a:rect l="l" t="t" r="r" b="b"/>
+              <a:pathLst>
+                <a:path w="10000" h="8000">
+                  <a:moveTo>
+                    <a:pt x="0" y="0"/>
+                  </a:moveTo>
+                  <a:lnTo>
+                    <a:pt x="0" y="7970"/>
+                  </a:lnTo>
+                  <a:lnTo>
+                    <a:pt x="10000" y="8000"/>
+                  </a:lnTo>
+                  <a:lnTo>
+                    <a:pt x="10000" y="7"/>
+                  </a:lnTo>
+                  <a:lnTo>
+                    <a:pt x="10000" y="7"/>
+                  </a:lnTo>
+                  <a:lnTo>
+                    <a:pt x="9773" y="156"/>
+                  </a:lnTo>
+                  <a:lnTo>
+                    <a:pt x="9547" y="298"/>
+                  </a:lnTo>
+                  <a:lnTo>
+                    <a:pt x="9320" y="437"/>
+                  </a:lnTo>
+                  <a:lnTo>
+                    <a:pt x="9092" y="556"/>
+                  </a:lnTo>
+                  <a:lnTo>
+                    <a:pt x="8865" y="676"/>
+                  </a:lnTo>
+                  <a:lnTo>
+                    <a:pt x="8637" y="788"/>
+                  </a:lnTo>
+                  <a:lnTo>
+                    <a:pt x="8412" y="884"/>
+                  </a:lnTo>
+                  <a:lnTo>
+                    <a:pt x="8184" y="975"/>
+                  </a:lnTo>
+                  <a:lnTo>
+                    <a:pt x="7957" y="1058"/>
+                  </a:lnTo>
+                  <a:lnTo>
+                    <a:pt x="7734" y="1130"/>
+                  </a:lnTo>
+                  <a:lnTo>
+                    <a:pt x="7508" y="1202"/>
+                  </a:lnTo>
+                  <a:lnTo>
+                    <a:pt x="7285" y="1262"/>
+                  </a:lnTo>
+                  <a:lnTo>
+                    <a:pt x="7062" y="1309"/>
+                  </a:lnTo>
+                  <a:lnTo>
+                    <a:pt x="6840" y="1358"/>
+                  </a:lnTo>
+                  <a:lnTo>
+                    <a:pt x="6620" y="1399"/>
+                  </a:lnTo>
+                  <a:lnTo>
+                    <a:pt x="6402" y="1428"/>
+                  </a:lnTo>
+                  <a:lnTo>
+                    <a:pt x="6184" y="1453"/>
+                  </a:lnTo>
+                  <a:lnTo>
+                    <a:pt x="5968" y="1477"/>
+                  </a:lnTo>
+                  <a:lnTo>
+                    <a:pt x="5755" y="1488"/>
+                  </a:lnTo>
+                  <a:lnTo>
+                    <a:pt x="5542" y="1500"/>
+                  </a:lnTo>
+                  <a:lnTo>
+                    <a:pt x="5332" y="1506"/>
+                  </a:lnTo>
+                  <a:lnTo>
+                    <a:pt x="5124" y="1500"/>
+                  </a:lnTo>
+                  <a:lnTo>
+                    <a:pt x="4918" y="1500"/>
+                  </a:lnTo>
+                  <a:lnTo>
+                    <a:pt x="4714" y="1488"/>
+                  </a:lnTo>
+                  <a:lnTo>
+                    <a:pt x="4514" y="1470"/>
+                  </a:lnTo>
+                  <a:lnTo>
+                    <a:pt x="4316" y="1453"/>
+                  </a:lnTo>
+                  <a:lnTo>
+                    <a:pt x="4122" y="1434"/>
+                  </a:lnTo>
+                  <a:lnTo>
+                    <a:pt x="3929" y="1405"/>
+                  </a:lnTo>
+                  <a:lnTo>
+                    <a:pt x="3739" y="1374"/>
+                  </a:lnTo>
+                  <a:lnTo>
+                    <a:pt x="3553" y="1346"/>
+                  </a:lnTo>
+                  <a:lnTo>
+                    <a:pt x="3190" y="1267"/>
+                  </a:lnTo>
+                  <a:lnTo>
+                    <a:pt x="2842" y="1183"/>
+                  </a:lnTo>
+                  <a:lnTo>
+                    <a:pt x="2508" y="1095"/>
+                  </a:lnTo>
+                  <a:lnTo>
+                    <a:pt x="2192" y="998"/>
+                  </a:lnTo>
+                  <a:lnTo>
+                    <a:pt x="1890" y="897"/>
+                  </a:lnTo>
+                  <a:lnTo>
+                    <a:pt x="1610" y="788"/>
+                  </a:lnTo>
+                  <a:lnTo>
+                    <a:pt x="1347" y="681"/>
+                  </a:lnTo>
+                  <a:lnTo>
+                    <a:pt x="1105" y="574"/>
+                  </a:lnTo>
+                  <a:lnTo>
+                    <a:pt x="883" y="473"/>
+                  </a:lnTo>
+                  <a:lnTo>
+                    <a:pt x="686" y="377"/>
+                  </a:lnTo>
+                  <a:lnTo>
+                    <a:pt x="508" y="286"/>
+                  </a:lnTo>
+                  <a:lnTo>
+                    <a:pt x="358" y="210"/>
+                  </a:lnTo>
+                  <a:lnTo>
+                    <a:pt x="232" y="138"/>
+                  </a:lnTo>
+                  <a:lnTo>
+                    <a:pt x="59" y="35"/>
+                  </a:lnTo>
+                  <a:lnTo>
+                    <a:pt x="0" y="0"/>
+                  </a:lnTo>
+                  <a:lnTo>
+                    <a:pt x="0" y="0"/>
+                  </a:lnTo>
+                  <a:close/>
+                </a:path>
+              </a:pathLst>
+            </a:custGeom>
+            <a:solidFill>
+              <a:schemeClr val="bg1"/>
+            </a:solidFill>
+            <a:ln>
+              <a:noFill/>
+            </a:ln>
+          </p:spPr>
+        </p:sp>
+        <p:sp>
+          <p:nvSpPr>
+            <p:cNvPr id="41" name="Freeform 5">
+              <a:extLst>
+                <a:ext uri="{FF2B5EF4-FFF2-40B4-BE49-F238E27FC236}">
+                  <a16:creationId xmlns:a16="http://schemas.microsoft.com/office/drawing/2014/main" id="{E6E565DF-7B86-474B-B8AC-91030F86CEF3}"/>
+                </a:ext>
+                <a:ext uri="{C183D7F6-B498-43B3-948B-1728B52AA6E4}">
+                  <adec:decorative xmlns:adec="http://schemas.microsoft.com/office/drawing/2017/decorative" val="1"/>
+                </a:ext>
+              </a:extLst>
+            </p:cNvPr>
+            <p:cNvSpPr>
+              <a:spLocks noEditPoints="1"/>
+            </p:cNvSpPr>
+            <p:nvPr>
+              <p:extLst>
+                <p:ext uri="{386F3935-93C4-4BCD-93E2-E3B085C9AB24}">
+                  <p16:designElem xmlns:p16="http://schemas.microsoft.com/office/powerpoint/2015/main" val="1"/>
+                </p:ext>
+              </p:extLst>
+            </p:nvPr>
+          </p:nvSpPr>
+          <p:spPr bwMode="gray">
+            <a:xfrm>
+              <a:off x="0" y="1587"/>
+              <a:ext cx="12192000" cy="6856413"/>
+            </a:xfrm>
+            <a:custGeom>
+              <a:avLst/>
+              <a:gdLst/>
+              <a:ahLst/>
+              <a:cxnLst/>
+              <a:rect l="0" t="0" r="r" b="b"/>
+              <a:pathLst>
+                <a:path w="15356" h="8638">
+                  <a:moveTo>
+                    <a:pt x="0" y="0"/>
+                  </a:moveTo>
+                  <a:lnTo>
+                    <a:pt x="0" y="8638"/>
+                  </a:lnTo>
+                  <a:lnTo>
+                    <a:pt x="15356" y="8638"/>
+                  </a:lnTo>
+                  <a:lnTo>
+                    <a:pt x="15356" y="0"/>
+                  </a:lnTo>
+                  <a:lnTo>
+                    <a:pt x="0" y="0"/>
+                  </a:lnTo>
+                  <a:close/>
+                  <a:moveTo>
+                    <a:pt x="14748" y="8038"/>
+                  </a:moveTo>
+                  <a:lnTo>
+                    <a:pt x="600" y="8038"/>
+                  </a:lnTo>
+                  <a:lnTo>
+                    <a:pt x="600" y="592"/>
+                  </a:lnTo>
+                  <a:lnTo>
+                    <a:pt x="14748" y="592"/>
+                  </a:lnTo>
+                  <a:lnTo>
+                    <a:pt x="14748" y="8038"/>
+                  </a:lnTo>
+                  <a:close/>
+                </a:path>
+              </a:pathLst>
+            </a:custGeom>
+            <a:solidFill>
+              <a:schemeClr val="bg1"/>
+            </a:solidFill>
+            <a:ln>
+              <a:noFill/>
+            </a:ln>
+          </p:spPr>
+        </p:sp>
+      </p:grpSp>
+      <p:sp>
+        <p:nvSpPr>
+          <p:cNvPr id="2" name="Título 1">
+            <a:extLst>
+              <a:ext uri="{FF2B5EF4-FFF2-40B4-BE49-F238E27FC236}">
+                <a16:creationId xmlns:a16="http://schemas.microsoft.com/office/drawing/2014/main" id="{2943CA8B-34CB-241D-BE87-7A4C73722E3C}"/>
+              </a:ext>
+            </a:extLst>
+          </p:cNvPr>
+          <p:cNvSpPr>
+            <a:spLocks noGrp="1"/>
+          </p:cNvSpPr>
+          <p:nvPr>
+            <p:ph type="title"/>
+          </p:nvPr>
+        </p:nvSpPr>
+        <p:spPr>
+          <a:xfrm>
+            <a:off x="1154955" y="973668"/>
+            <a:ext cx="2942210" cy="1020232"/>
+          </a:xfrm>
+        </p:spPr>
+        <p:txBody>
+          <a:bodyPr>
+            <a:normAutofit/>
+          </a:bodyPr>
+          <a:lstStyle/>
+          <a:p>
+            <a:pPr>
+              <a:lnSpc>
+                <a:spcPct val="90000"/>
+              </a:lnSpc>
+            </a:pPr>
+            <a:r>
+              <a:rPr lang="pt-PT" sz="2000"/>
+              <a:t>Competências antes e depois do projeto </a:t>
+            </a:r>
+          </a:p>
+        </p:txBody>
+      </p:sp>
+      <p:sp>
+        <p:nvSpPr>
+          <p:cNvPr id="28" name="Content Placeholder 10">
+            <a:extLst>
+              <a:ext uri="{FF2B5EF4-FFF2-40B4-BE49-F238E27FC236}">
+                <a16:creationId xmlns:a16="http://schemas.microsoft.com/office/drawing/2014/main" id="{2CC5AC06-F708-9596-D0CA-476F09DC779E}"/>
+              </a:ext>
+            </a:extLst>
+          </p:cNvPr>
+          <p:cNvSpPr>
+            <a:spLocks noGrp="1"/>
+          </p:cNvSpPr>
+          <p:nvPr>
+            <p:ph idx="1"/>
+          </p:nvPr>
+        </p:nvSpPr>
+        <p:spPr>
+          <a:xfrm>
+            <a:off x="1154955" y="2120900"/>
+            <a:ext cx="3133726" cy="3898900"/>
+          </a:xfrm>
+        </p:spPr>
+        <p:txBody>
+          <a:bodyPr>
+            <a:normAutofit/>
+          </a:bodyPr>
+          <a:lstStyle/>
+          <a:p>
+            <a:r>
+              <a:rPr lang="en-US" dirty="0">
+                <a:solidFill>
+                  <a:schemeClr val="accent5"/>
+                </a:solidFill>
+              </a:rPr>
+              <a:t>Azul</a:t>
+            </a:r>
+            <a:r>
+              <a:rPr lang="en-US" dirty="0">
+                <a:solidFill>
+                  <a:schemeClr val="bg1"/>
+                </a:solidFill>
+              </a:rPr>
+              <a:t> – José Monteiro </a:t>
+            </a:r>
+          </a:p>
+          <a:p>
+            <a:r>
+              <a:rPr lang="en-US" dirty="0" err="1">
+                <a:solidFill>
+                  <a:srgbClr val="FFFF00"/>
+                </a:solidFill>
+              </a:rPr>
+              <a:t>Amarelo</a:t>
+            </a:r>
+            <a:r>
+              <a:rPr lang="en-US" dirty="0">
+                <a:solidFill>
+                  <a:schemeClr val="bg1"/>
+                </a:solidFill>
+              </a:rPr>
+              <a:t> – João Marques </a:t>
+            </a:r>
+          </a:p>
+          <a:p>
+            <a:r>
+              <a:rPr lang="en-US" dirty="0">
+                <a:solidFill>
+                  <a:srgbClr val="7030A0"/>
+                </a:solidFill>
+              </a:rPr>
+              <a:t>Rosa</a:t>
+            </a:r>
+            <a:r>
+              <a:rPr lang="en-US" dirty="0">
+                <a:solidFill>
+                  <a:schemeClr val="bg1"/>
+                </a:solidFill>
+              </a:rPr>
+              <a:t> – Paulo Couto</a:t>
+            </a:r>
+          </a:p>
+          <a:p>
+            <a:r>
+              <a:rPr lang="en-US" dirty="0" err="1">
+                <a:solidFill>
+                  <a:srgbClr val="FFC000"/>
+                </a:solidFill>
+              </a:rPr>
+              <a:t>Laranja</a:t>
+            </a:r>
+            <a:r>
+              <a:rPr lang="en-US" dirty="0">
+                <a:solidFill>
+                  <a:schemeClr val="bg1"/>
+                </a:solidFill>
+              </a:rPr>
+              <a:t> – José Rocha </a:t>
+            </a:r>
+          </a:p>
+          <a:p>
+            <a:r>
+              <a:rPr lang="en-US" dirty="0">
+                <a:solidFill>
+                  <a:srgbClr val="FF0000"/>
+                </a:solidFill>
+              </a:rPr>
+              <a:t>Vermelho</a:t>
+            </a:r>
+            <a:r>
+              <a:rPr lang="en-US" dirty="0">
+                <a:solidFill>
+                  <a:schemeClr val="bg1"/>
+                </a:solidFill>
+              </a:rPr>
+              <a:t> – Luís Ferreira</a:t>
+            </a:r>
+          </a:p>
+        </p:txBody>
+      </p:sp>
+      <p:pic>
+        <p:nvPicPr>
+          <p:cNvPr id="9" name="Imagem 8">
+            <a:extLst>
+              <a:ext uri="{FF2B5EF4-FFF2-40B4-BE49-F238E27FC236}">
+                <a16:creationId xmlns:a16="http://schemas.microsoft.com/office/drawing/2014/main" id="{74DAB8CB-8157-0E87-2970-FA5F53AA3337}"/>
+              </a:ext>
+            </a:extLst>
+          </p:cNvPr>
+          <p:cNvPicPr>
+            <a:picLocks noChangeAspect="1"/>
+          </p:cNvPicPr>
+          <p:nvPr/>
+        </p:nvPicPr>
+        <p:blipFill>
+          <a:blip r:embed="rId3"/>
+          <a:stretch>
+            <a:fillRect/>
+          </a:stretch>
+        </p:blipFill>
+        <p:spPr>
+          <a:xfrm>
+            <a:off x="8726098" y="2120900"/>
+            <a:ext cx="3113903" cy="2522261"/>
+          </a:xfrm>
+          <a:prstGeom prst="rect">
+            <a:avLst/>
+          </a:prstGeom>
+        </p:spPr>
+      </p:pic>
+      <p:pic>
+        <p:nvPicPr>
+          <p:cNvPr id="12" name="Imagem 11">
+            <a:extLst>
+              <a:ext uri="{FF2B5EF4-FFF2-40B4-BE49-F238E27FC236}">
+                <a16:creationId xmlns:a16="http://schemas.microsoft.com/office/drawing/2014/main" id="{4127CA19-0C53-C210-16B0-8648CE272BE5}"/>
+              </a:ext>
+            </a:extLst>
+          </p:cNvPr>
+          <p:cNvPicPr>
+            <a:picLocks noChangeAspect="1"/>
+          </p:cNvPicPr>
+          <p:nvPr/>
+        </p:nvPicPr>
+        <p:blipFill>
+          <a:blip r:embed="rId4"/>
+          <a:stretch>
+            <a:fillRect/>
+          </a:stretch>
+        </p:blipFill>
+        <p:spPr>
+          <a:xfrm>
+            <a:off x="5334476" y="2120900"/>
+            <a:ext cx="3113904" cy="2522262"/>
+          </a:xfrm>
+          <a:prstGeom prst="rect">
+            <a:avLst/>
+          </a:prstGeom>
+        </p:spPr>
+      </p:pic>
+      <p:sp>
+        <p:nvSpPr>
+          <p:cNvPr id="43" name="Rectangle 42">
+            <a:extLst>
+              <a:ext uri="{FF2B5EF4-FFF2-40B4-BE49-F238E27FC236}">
+                <a16:creationId xmlns:a16="http://schemas.microsoft.com/office/drawing/2014/main" id="{EE014219-6CDC-41FE-B059-D98980F54524}"/>
+              </a:ext>
+              <a:ext uri="{C183D7F6-B498-43B3-948B-1728B52AA6E4}">
+                <adec:decorative xmlns:adec="http://schemas.microsoft.com/office/drawing/2017/decorative" val="1"/>
+              </a:ext>
+            </a:extLst>
+          </p:cNvPr>
+          <p:cNvSpPr>
+            <a:spLocks noGrp="1" noRot="1" noChangeAspect="1" noMove="1" noResize="1" noEditPoints="1" noAdjustHandles="1" noChangeArrowheads="1" noChangeShapeType="1" noTextEdit="1"/>
+          </p:cNvSpPr>
+          <p:nvPr>
+            <p:extLst>
+              <p:ext uri="{386F3935-93C4-4BCD-93E2-E3B085C9AB24}">
+                <p16:designElem xmlns:p16="http://schemas.microsoft.com/office/powerpoint/2015/main" val="1"/>
+              </p:ext>
+            </p:extLst>
+          </p:nvPr>
+        </p:nvSpPr>
+        <p:spPr>
+          <a:xfrm>
+            <a:off x="10437812" y="0"/>
+            <a:ext cx="685800" cy="1143000"/>
+          </a:xfrm>
+          <a:prstGeom prst="rect">
+            <a:avLst/>
+          </a:prstGeom>
+          <a:solidFill>
+            <a:schemeClr val="accent1"/>
+          </a:solidFill>
+          <a:ln>
+            <a:noFill/>
+          </a:ln>
+        </p:spPr>
+        <p:style>
+          <a:lnRef idx="1">
+            <a:schemeClr val="accent1"/>
+          </a:lnRef>
+          <a:fillRef idx="3">
+            <a:schemeClr val="accent1"/>
+          </a:fillRef>
+          <a:effectRef idx="2">
+            <a:schemeClr val="accent1"/>
+          </a:effectRef>
+          <a:fontRef idx="minor">
+            <a:schemeClr val="lt1"/>
+          </a:fontRef>
+        </p:style>
+      </p:sp>
+    </p:spTree>
+    <p:extLst>
+      <p:ext uri="{BB962C8B-B14F-4D97-AF65-F5344CB8AC3E}">
+        <p14:creationId xmlns:p14="http://schemas.microsoft.com/office/powerpoint/2010/main" val="1235769700"/>
+      </p:ext>
+    </p:extLst>
+  </p:cSld>
+  <p:clrMapOvr>
+    <a:masterClrMapping/>
+  </p:clrMapOvr>
+</p:sld>
+</file>
+
+<file path=ppt/slides/slide15.xml><?xml version="1.0" encoding="utf-8"?>
 <p:sld xmlns:a="http://schemas.openxmlformats.org/drawingml/2006/main" xmlns:r="http://schemas.openxmlformats.org/officeDocument/2006/relationships" xmlns:p="http://schemas.openxmlformats.org/presentationml/2006/main">
   <p:cSld>
     <p:spTree>

</xml_diff>